<commit_message>
fixed the vignette to use the new syntax
</commit_message>
<xml_diff>
--- a/vignettes/figures/organization.pptx
+++ b/vignettes/figures/organization.pptx
@@ -4091,8 +4091,8 @@
         </p:nvSpPr>
         <p:spPr>
           <a:xfrm>
-            <a:off x="617835" y="4477072"/>
-            <a:ext cx="3177924" cy="307777"/>
+            <a:off x="617834" y="4477072"/>
+            <a:ext cx="3373397" cy="307777"/>
           </a:xfrm>
           <a:prstGeom prst="rect">
             <a:avLst/>
@@ -4111,6 +4111,16 @@
           <a:lstStyle/>
           <a:p>
             <a:r>
+              <a:rPr lang="en-US" sz="1400" dirty="0">
+                <a:solidFill>
+                  <a:srgbClr val="FF0000"/>
+                </a:solidFill>
+                <a:latin typeface="Courier New" panose="02070309020205020404" pitchFamily="49" charset="0"/>
+                <a:cs typeface="Courier New" panose="02070309020205020404" pitchFamily="49" charset="0"/>
+              </a:rPr>
+              <a:t>.</a:t>
+            </a:r>
+            <a:r>
               <a:rPr lang="en-US" sz="1400" dirty="0" err="1">
                 <a:solidFill>
                   <a:srgbClr val="FF0000"/>
@@ -4144,8 +4154,8 @@
         </p:nvSpPr>
         <p:spPr>
           <a:xfrm>
-            <a:off x="4696867" y="4473042"/>
-            <a:ext cx="2018678" cy="307777"/>
+            <a:off x="4696866" y="4473042"/>
+            <a:ext cx="2198203" cy="307777"/>
           </a:xfrm>
           <a:prstGeom prst="rect">
             <a:avLst/>
@@ -4164,6 +4174,13 @@
           <a:lstStyle/>
           <a:p>
             <a:r>
+              <a:rPr lang="en-US" sz="1400" dirty="0">
+                <a:latin typeface="Courier New" panose="02070309020205020404" pitchFamily="49" charset="0"/>
+                <a:cs typeface="Courier New" panose="02070309020205020404" pitchFamily="49" charset="0"/>
+              </a:rPr>
+              <a:t>.</a:t>
+            </a:r>
+            <a:r>
               <a:rPr lang="en-US" sz="1400" dirty="0" err="1">
                 <a:latin typeface="Courier New" panose="02070309020205020404" pitchFamily="49" charset="0"/>
                 <a:cs typeface="Courier New" panose="02070309020205020404" pitchFamily="49" charset="0"/>
@@ -4192,7 +4209,7 @@
         <p:spPr>
           <a:xfrm>
             <a:off x="8674443" y="4473042"/>
-            <a:ext cx="3233349" cy="307777"/>
+            <a:ext cx="3323968" cy="307777"/>
           </a:xfrm>
           <a:prstGeom prst="rect">
             <a:avLst/>
@@ -4316,7 +4333,7 @@
         <p:spPr>
           <a:xfrm>
             <a:off x="4724401" y="3325081"/>
-            <a:ext cx="3233350" cy="430887"/>
+            <a:ext cx="3356918" cy="430887"/>
           </a:xfrm>
           <a:prstGeom prst="rect">
             <a:avLst/>
@@ -4346,6 +4363,10 @@
           <a:p>
             <a:pPr algn="l"/>
             <a:r>
+              <a:rPr lang="en-US" sz="1100" dirty="0"/>
+              <a:t>.</a:t>
+            </a:r>
+            <a:r>
               <a:rPr lang="en-US" sz="1100" dirty="0" err="1"/>
               <a:t>vdraw_intensity_step_regular_cpp</a:t>
             </a:r>
@@ -4353,6 +4374,10 @@
           </a:p>
           <a:p>
             <a:pPr algn="l"/>
+            <a:r>
+              <a:rPr lang="en-US" sz="1100" dirty="0"/>
+              <a:t>.</a:t>
+            </a:r>
             <a:r>
               <a:rPr lang="en-US" sz="1100" dirty="0" err="1"/>
               <a:t>vdraw_intensity_step_regular_forcezt</a:t>
@@ -4504,6 +4529,10 @@
           </a:lstStyle>
           <a:p>
             <a:pPr algn="l"/>
+            <a:r>
+              <a:rPr lang="en-US" sz="1100" dirty="0"/>
+              <a:t>.</a:t>
+            </a:r>
             <a:r>
               <a:rPr lang="en-US" sz="1100" dirty="0" err="1"/>
               <a:t>vztdraw_intensity_step_regular</a:t>

</xml_diff>